<commit_message>
file download 구현 완료
</commit_message>
<xml_diff>
--- a/doc/studyer_project.pptx
+++ b/doc/studyer_project.pptx
@@ -11,6 +11,11 @@
     <p:sldId id="260" r:id="rId5"/>
     <p:sldId id="262" r:id="rId6"/>
     <p:sldId id="261" r:id="rId7"/>
+    <p:sldId id="263" r:id="rId8"/>
+    <p:sldId id="264" r:id="rId9"/>
+    <p:sldId id="265" r:id="rId10"/>
+    <p:sldId id="266" r:id="rId11"/>
+    <p:sldId id="267" r:id="rId12"/>
   </p:sldIdLst>
   <p:sldSz cx="9144000" cy="6858000" type="screen4x3"/>
   <p:notesSz cx="6858000" cy="9144000"/>
@@ -294,7 +299,7 @@
             <a:fld id="{E3F10041-8F81-43B1-9F54-930BAC24D416}" type="datetimeFigureOut">
               <a:rPr lang="ko-KR" altLang="en-US" smtClean="0"/>
               <a:pPr/>
-              <a:t>2015-05-22</a:t>
+              <a:t>2015-05-28</a:t>
             </a:fld>
             <a:endParaRPr lang="ko-KR" altLang="en-US"/>
           </a:p>
@@ -461,7 +466,7 @@
             <a:fld id="{E3F10041-8F81-43B1-9F54-930BAC24D416}" type="datetimeFigureOut">
               <a:rPr lang="ko-KR" altLang="en-US" smtClean="0"/>
               <a:pPr/>
-              <a:t>2015-05-22</a:t>
+              <a:t>2015-05-28</a:t>
             </a:fld>
             <a:endParaRPr lang="ko-KR" altLang="en-US"/>
           </a:p>
@@ -638,7 +643,7 @@
             <a:fld id="{E3F10041-8F81-43B1-9F54-930BAC24D416}" type="datetimeFigureOut">
               <a:rPr lang="ko-KR" altLang="en-US" smtClean="0"/>
               <a:pPr/>
-              <a:t>2015-05-22</a:t>
+              <a:t>2015-05-28</a:t>
             </a:fld>
             <a:endParaRPr lang="ko-KR" altLang="en-US"/>
           </a:p>
@@ -805,7 +810,7 @@
             <a:fld id="{E3F10041-8F81-43B1-9F54-930BAC24D416}" type="datetimeFigureOut">
               <a:rPr lang="ko-KR" altLang="en-US" smtClean="0"/>
               <a:pPr/>
-              <a:t>2015-05-22</a:t>
+              <a:t>2015-05-28</a:t>
             </a:fld>
             <a:endParaRPr lang="ko-KR" altLang="en-US"/>
           </a:p>
@@ -1048,7 +1053,7 @@
             <a:fld id="{E3F10041-8F81-43B1-9F54-930BAC24D416}" type="datetimeFigureOut">
               <a:rPr lang="ko-KR" altLang="en-US" smtClean="0"/>
               <a:pPr/>
-              <a:t>2015-05-22</a:t>
+              <a:t>2015-05-28</a:t>
             </a:fld>
             <a:endParaRPr lang="ko-KR" altLang="en-US"/>
           </a:p>
@@ -1333,7 +1338,7 @@
             <a:fld id="{E3F10041-8F81-43B1-9F54-930BAC24D416}" type="datetimeFigureOut">
               <a:rPr lang="ko-KR" altLang="en-US" smtClean="0"/>
               <a:pPr/>
-              <a:t>2015-05-22</a:t>
+              <a:t>2015-05-28</a:t>
             </a:fld>
             <a:endParaRPr lang="ko-KR" altLang="en-US"/>
           </a:p>
@@ -1752,7 +1757,7 @@
             <a:fld id="{E3F10041-8F81-43B1-9F54-930BAC24D416}" type="datetimeFigureOut">
               <a:rPr lang="ko-KR" altLang="en-US" smtClean="0"/>
               <a:pPr/>
-              <a:t>2015-05-22</a:t>
+              <a:t>2015-05-28</a:t>
             </a:fld>
             <a:endParaRPr lang="ko-KR" altLang="en-US"/>
           </a:p>
@@ -1867,7 +1872,7 @@
             <a:fld id="{E3F10041-8F81-43B1-9F54-930BAC24D416}" type="datetimeFigureOut">
               <a:rPr lang="ko-KR" altLang="en-US" smtClean="0"/>
               <a:pPr/>
-              <a:t>2015-05-22</a:t>
+              <a:t>2015-05-28</a:t>
             </a:fld>
             <a:endParaRPr lang="ko-KR" altLang="en-US"/>
           </a:p>
@@ -1959,7 +1964,7 @@
             <a:fld id="{E3F10041-8F81-43B1-9F54-930BAC24D416}" type="datetimeFigureOut">
               <a:rPr lang="ko-KR" altLang="en-US" smtClean="0"/>
               <a:pPr/>
-              <a:t>2015-05-22</a:t>
+              <a:t>2015-05-28</a:t>
             </a:fld>
             <a:endParaRPr lang="ko-KR" altLang="en-US"/>
           </a:p>
@@ -2233,7 +2238,7 @@
             <a:fld id="{E3F10041-8F81-43B1-9F54-930BAC24D416}" type="datetimeFigureOut">
               <a:rPr lang="ko-KR" altLang="en-US" smtClean="0"/>
               <a:pPr/>
-              <a:t>2015-05-22</a:t>
+              <a:t>2015-05-28</a:t>
             </a:fld>
             <a:endParaRPr lang="ko-KR" altLang="en-US"/>
           </a:p>
@@ -2483,7 +2488,7 @@
             <a:fld id="{E3F10041-8F81-43B1-9F54-930BAC24D416}" type="datetimeFigureOut">
               <a:rPr lang="ko-KR" altLang="en-US" smtClean="0"/>
               <a:pPr/>
-              <a:t>2015-05-22</a:t>
+              <a:t>2015-05-28</a:t>
             </a:fld>
             <a:endParaRPr lang="ko-KR" altLang="en-US"/>
           </a:p>
@@ -2693,7 +2698,7 @@
             <a:fld id="{E3F10041-8F81-43B1-9F54-930BAC24D416}" type="datetimeFigureOut">
               <a:rPr lang="ko-KR" altLang="en-US" smtClean="0"/>
               <a:pPr/>
-              <a:t>2015-05-22</a:t>
+              <a:t>2015-05-28</a:t>
             </a:fld>
             <a:endParaRPr lang="ko-KR" altLang="en-US"/>
           </a:p>
@@ -3227,6 +3232,270 @@
 </p:sld>
 </file>
 
+<file path=ppt/slides/slide10.xml><?xml version="1.0" encoding="utf-8"?>
+<p:sld xmlns:a="http://schemas.openxmlformats.org/drawingml/2006/main" xmlns:r="http://schemas.openxmlformats.org/officeDocument/2006/relationships" xmlns:p="http://schemas.openxmlformats.org/presentationml/2006/main">
+  <p:cSld>
+    <p:spTree>
+      <p:nvGrpSpPr>
+        <p:cNvPr id="1" name=""/>
+        <p:cNvGrpSpPr/>
+        <p:nvPr/>
+      </p:nvGrpSpPr>
+      <p:grpSpPr>
+        <a:xfrm>
+          <a:off x="0" y="0"/>
+          <a:ext cx="0" cy="0"/>
+          <a:chOff x="0" y="0"/>
+          <a:chExt cx="0" cy="0"/>
+        </a:xfrm>
+      </p:grpSpPr>
+      <p:sp>
+        <p:nvSpPr>
+          <p:cNvPr id="6" name="직사각형 5"/>
+          <p:cNvSpPr/>
+          <p:nvPr/>
+        </p:nvSpPr>
+        <p:spPr>
+          <a:xfrm>
+            <a:off x="2123728" y="908720"/>
+            <a:ext cx="4896544" cy="540000"/>
+          </a:xfrm>
+          <a:prstGeom prst="rect">
+            <a:avLst/>
+          </a:prstGeom>
+          <a:noFill/>
+          <a:ln>
+            <a:noFill/>
+          </a:ln>
+        </p:spPr>
+        <p:style>
+          <a:lnRef idx="2">
+            <a:schemeClr val="accent1">
+              <a:shade val="50000"/>
+            </a:schemeClr>
+          </a:lnRef>
+          <a:fillRef idx="1">
+            <a:schemeClr val="accent1"/>
+          </a:fillRef>
+          <a:effectRef idx="0">
+            <a:schemeClr val="accent1"/>
+          </a:effectRef>
+          <a:fontRef idx="minor">
+            <a:schemeClr val="lt1"/>
+          </a:fontRef>
+        </p:style>
+        <p:txBody>
+          <a:bodyPr rtlCol="0" anchor="ctr"/>
+          <a:lstStyle/>
+          <a:p>
+            <a:pPr algn="ctr"/>
+            <a:r>
+              <a:rPr lang="en-US" altLang="ko-KR" sz="2000" dirty="0" smtClean="0">
+                <a:solidFill>
+                  <a:schemeClr val="tx1"/>
+                </a:solidFill>
+                <a:latin typeface="Arial Unicode MS" pitchFamily="50" charset="-127"/>
+                <a:ea typeface="Arial Unicode MS" pitchFamily="50" charset="-127"/>
+                <a:cs typeface="Arial Unicode MS" pitchFamily="50" charset="-127"/>
+              </a:rPr>
+              <a:t>STUDYER _ Prototype</a:t>
+            </a:r>
+            <a:endParaRPr lang="ko-KR" altLang="en-US" sz="2000" dirty="0">
+              <a:solidFill>
+                <a:schemeClr val="tx1"/>
+              </a:solidFill>
+              <a:latin typeface="Arial Unicode MS" pitchFamily="50" charset="-127"/>
+              <a:ea typeface="Arial Unicode MS" pitchFamily="50" charset="-127"/>
+              <a:cs typeface="Arial Unicode MS" pitchFamily="50" charset="-127"/>
+            </a:endParaRPr>
+          </a:p>
+        </p:txBody>
+      </p:sp>
+      <p:cxnSp>
+        <p:nvCxnSpPr>
+          <p:cNvPr id="8" name="직선 연결선 7"/>
+          <p:cNvCxnSpPr/>
+          <p:nvPr/>
+        </p:nvCxnSpPr>
+        <p:spPr>
+          <a:xfrm>
+            <a:off x="791580" y="1556792"/>
+            <a:ext cx="7560840" cy="0"/>
+          </a:xfrm>
+          <a:prstGeom prst="line">
+            <a:avLst/>
+          </a:prstGeom>
+          <a:ln>
+            <a:solidFill>
+              <a:schemeClr val="tx1">
+                <a:lumMod val="65000"/>
+                <a:lumOff val="35000"/>
+              </a:schemeClr>
+            </a:solidFill>
+          </a:ln>
+        </p:spPr>
+        <p:style>
+          <a:lnRef idx="1">
+            <a:schemeClr val="accent1"/>
+          </a:lnRef>
+          <a:fillRef idx="0">
+            <a:schemeClr val="accent1"/>
+          </a:fillRef>
+          <a:effectRef idx="0">
+            <a:schemeClr val="accent1"/>
+          </a:effectRef>
+          <a:fontRef idx="minor">
+            <a:schemeClr val="tx1"/>
+          </a:fontRef>
+        </p:style>
+      </p:cxnSp>
+    </p:spTree>
+  </p:cSld>
+  <p:clrMapOvr>
+    <a:masterClrMapping/>
+  </p:clrMapOvr>
+  <p:timing>
+    <p:tnLst>
+      <p:par>
+        <p:cTn id="1" dur="indefinite" restart="never" nodeType="tmRoot"/>
+      </p:par>
+    </p:tnLst>
+  </p:timing>
+</p:sld>
+</file>
+
+<file path=ppt/slides/slide11.xml><?xml version="1.0" encoding="utf-8"?>
+<p:sld xmlns:a="http://schemas.openxmlformats.org/drawingml/2006/main" xmlns:r="http://schemas.openxmlformats.org/officeDocument/2006/relationships" xmlns:p="http://schemas.openxmlformats.org/presentationml/2006/main">
+  <p:cSld>
+    <p:spTree>
+      <p:nvGrpSpPr>
+        <p:cNvPr id="1" name=""/>
+        <p:cNvGrpSpPr/>
+        <p:nvPr/>
+      </p:nvGrpSpPr>
+      <p:grpSpPr>
+        <a:xfrm>
+          <a:off x="0" y="0"/>
+          <a:ext cx="0" cy="0"/>
+          <a:chOff x="0" y="0"/>
+          <a:chExt cx="0" cy="0"/>
+        </a:xfrm>
+      </p:grpSpPr>
+      <p:sp>
+        <p:nvSpPr>
+          <p:cNvPr id="6" name="직사각형 5"/>
+          <p:cNvSpPr/>
+          <p:nvPr/>
+        </p:nvSpPr>
+        <p:spPr>
+          <a:xfrm>
+            <a:off x="2123728" y="908720"/>
+            <a:ext cx="4896544" cy="540000"/>
+          </a:xfrm>
+          <a:prstGeom prst="rect">
+            <a:avLst/>
+          </a:prstGeom>
+          <a:noFill/>
+          <a:ln>
+            <a:noFill/>
+          </a:ln>
+        </p:spPr>
+        <p:style>
+          <a:lnRef idx="2">
+            <a:schemeClr val="accent1">
+              <a:shade val="50000"/>
+            </a:schemeClr>
+          </a:lnRef>
+          <a:fillRef idx="1">
+            <a:schemeClr val="accent1"/>
+          </a:fillRef>
+          <a:effectRef idx="0">
+            <a:schemeClr val="accent1"/>
+          </a:effectRef>
+          <a:fontRef idx="minor">
+            <a:schemeClr val="lt1"/>
+          </a:fontRef>
+        </p:style>
+        <p:txBody>
+          <a:bodyPr rtlCol="0" anchor="ctr"/>
+          <a:lstStyle/>
+          <a:p>
+            <a:pPr algn="ctr"/>
+            <a:r>
+              <a:rPr lang="en-US" altLang="ko-KR" sz="2000" dirty="0" smtClean="0">
+                <a:solidFill>
+                  <a:schemeClr val="tx1"/>
+                </a:solidFill>
+                <a:latin typeface="Arial Unicode MS" pitchFamily="50" charset="-127"/>
+                <a:ea typeface="Arial Unicode MS" pitchFamily="50" charset="-127"/>
+                <a:cs typeface="Arial Unicode MS" pitchFamily="50" charset="-127"/>
+              </a:rPr>
+              <a:t>STUDYER _ Prototype</a:t>
+            </a:r>
+            <a:endParaRPr lang="ko-KR" altLang="en-US" sz="2000" dirty="0">
+              <a:solidFill>
+                <a:schemeClr val="tx1"/>
+              </a:solidFill>
+              <a:latin typeface="Arial Unicode MS" pitchFamily="50" charset="-127"/>
+              <a:ea typeface="Arial Unicode MS" pitchFamily="50" charset="-127"/>
+              <a:cs typeface="Arial Unicode MS" pitchFamily="50" charset="-127"/>
+            </a:endParaRPr>
+          </a:p>
+        </p:txBody>
+      </p:sp>
+      <p:cxnSp>
+        <p:nvCxnSpPr>
+          <p:cNvPr id="8" name="직선 연결선 7"/>
+          <p:cNvCxnSpPr/>
+          <p:nvPr/>
+        </p:nvCxnSpPr>
+        <p:spPr>
+          <a:xfrm>
+            <a:off x="791580" y="1556792"/>
+            <a:ext cx="7560840" cy="0"/>
+          </a:xfrm>
+          <a:prstGeom prst="line">
+            <a:avLst/>
+          </a:prstGeom>
+          <a:ln>
+            <a:solidFill>
+              <a:schemeClr val="tx1">
+                <a:lumMod val="65000"/>
+                <a:lumOff val="35000"/>
+              </a:schemeClr>
+            </a:solidFill>
+          </a:ln>
+        </p:spPr>
+        <p:style>
+          <a:lnRef idx="1">
+            <a:schemeClr val="accent1"/>
+          </a:lnRef>
+          <a:fillRef idx="0">
+            <a:schemeClr val="accent1"/>
+          </a:fillRef>
+          <a:effectRef idx="0">
+            <a:schemeClr val="accent1"/>
+          </a:effectRef>
+          <a:fontRef idx="minor">
+            <a:schemeClr val="tx1"/>
+          </a:fontRef>
+        </p:style>
+      </p:cxnSp>
+    </p:spTree>
+  </p:cSld>
+  <p:clrMapOvr>
+    <a:masterClrMapping/>
+  </p:clrMapOvr>
+  <p:timing>
+    <p:tnLst>
+      <p:par>
+        <p:cTn id="1" dur="indefinite" restart="never" nodeType="tmRoot"/>
+      </p:par>
+    </p:tnLst>
+  </p:timing>
+</p:sld>
+</file>
+
 <file path=ppt/slides/slide2.xml><?xml version="1.0" encoding="utf-8"?>
 <p:sld xmlns:a="http://schemas.openxmlformats.org/drawingml/2006/main" xmlns:r="http://schemas.openxmlformats.org/officeDocument/2006/relationships" xmlns:p="http://schemas.openxmlformats.org/presentationml/2006/main">
   <p:cSld>
@@ -3469,7 +3738,7 @@
           <a:bodyPr rtlCol="0" anchor="ctr"/>
           <a:lstStyle/>
           <a:p>
-            <a:pPr>
+            <a:pPr algn="ctr">
               <a:lnSpc>
                 <a:spcPct val="150000"/>
               </a:lnSpc>
@@ -3495,7 +3764,7 @@
             </a:endParaRPr>
           </a:p>
           <a:p>
-            <a:pPr>
+            <a:pPr algn="ctr">
               <a:lnSpc>
                 <a:spcPct val="150000"/>
               </a:lnSpc>
@@ -3521,7 +3790,7 @@
             </a:endParaRPr>
           </a:p>
           <a:p>
-            <a:pPr>
+            <a:pPr algn="ctr">
               <a:lnSpc>
                 <a:spcPct val="150000"/>
               </a:lnSpc>
@@ -6634,20 +6903,7 @@
                 <a:ea typeface="Arial Unicode MS" pitchFamily="50" charset="-127"/>
                 <a:cs typeface="Arial Unicode MS" pitchFamily="50" charset="-127"/>
               </a:rPr>
-              <a:t> </a:t>
-            </a:r>
-            <a:r>
-              <a:rPr lang="en-US" altLang="ko-KR" sz="1100" dirty="0" smtClean="0">
-                <a:solidFill>
-                  <a:schemeClr val="accent4">
-                    <a:lumMod val="75000"/>
-                  </a:schemeClr>
-                </a:solidFill>
-                <a:latin typeface="Arial Unicode MS" pitchFamily="50" charset="-127"/>
-                <a:ea typeface="Arial Unicode MS" pitchFamily="50" charset="-127"/>
-                <a:cs typeface="Arial Unicode MS" pitchFamily="50" charset="-127"/>
-              </a:rPr>
-              <a:t>primary</a:t>
+              <a:t> primary</a:t>
             </a:r>
           </a:p>
           <a:p>
@@ -6747,18 +7003,7 @@
                 <a:ea typeface="Arial Unicode MS" pitchFamily="50" charset="-127"/>
                 <a:cs typeface="Arial Unicode MS" pitchFamily="50" charset="-127"/>
               </a:rPr>
-              <a:t> </a:t>
-            </a:r>
-            <a:r>
-              <a:rPr lang="en-US" altLang="ko-KR" sz="1100" dirty="0" smtClean="0">
-                <a:solidFill>
-                  <a:srgbClr val="0070C0"/>
-                </a:solidFill>
-                <a:latin typeface="Arial Unicode MS" pitchFamily="50" charset="-127"/>
-                <a:ea typeface="Arial Unicode MS" pitchFamily="50" charset="-127"/>
-                <a:cs typeface="Arial Unicode MS" pitchFamily="50" charset="-127"/>
-              </a:rPr>
-              <a:t>foreign</a:t>
+              <a:t> foreign</a:t>
             </a:r>
           </a:p>
           <a:p>
@@ -6816,31 +7061,8 @@
                 <a:ea typeface="Arial Unicode MS" pitchFamily="50" charset="-127"/>
                 <a:cs typeface="Arial Unicode MS" pitchFamily="50" charset="-127"/>
               </a:rPr>
-              <a:t> </a:t>
-            </a:r>
-            <a:r>
-              <a:rPr lang="en-US" altLang="ko-KR" sz="1100" dirty="0" smtClean="0">
-                <a:solidFill>
-                  <a:schemeClr val="accent3">
-                    <a:lumMod val="75000"/>
-                  </a:schemeClr>
-                </a:solidFill>
-                <a:latin typeface="Arial Unicode MS" pitchFamily="50" charset="-127"/>
-                <a:ea typeface="Arial Unicode MS" pitchFamily="50" charset="-127"/>
-                <a:cs typeface="Arial Unicode MS" pitchFamily="50" charset="-127"/>
-              </a:rPr>
-              <a:t>foreign</a:t>
-            </a:r>
-            <a:endParaRPr lang="en-US" altLang="ko-KR" sz="1100" dirty="0" smtClean="0">
-              <a:solidFill>
-                <a:schemeClr val="accent3">
-                  <a:lumMod val="75000"/>
-                </a:schemeClr>
-              </a:solidFill>
-              <a:latin typeface="Arial Unicode MS" pitchFamily="50" charset="-127"/>
-              <a:ea typeface="Arial Unicode MS" pitchFamily="50" charset="-127"/>
-              <a:cs typeface="Arial Unicode MS" pitchFamily="50" charset="-127"/>
-            </a:endParaRPr>
+              <a:t> foreign</a:t>
+            </a:r>
           </a:p>
           <a:p>
             <a:pPr>
@@ -6897,31 +7119,8 @@
                 <a:ea typeface="Arial Unicode MS" pitchFamily="50" charset="-127"/>
                 <a:cs typeface="Arial Unicode MS" pitchFamily="50" charset="-127"/>
               </a:rPr>
-              <a:t> </a:t>
-            </a:r>
-            <a:r>
-              <a:rPr lang="en-US" altLang="ko-KR" sz="1100" dirty="0" smtClean="0">
-                <a:solidFill>
-                  <a:schemeClr val="accent6">
-                    <a:lumMod val="75000"/>
-                  </a:schemeClr>
-                </a:solidFill>
-                <a:latin typeface="Arial Unicode MS" pitchFamily="50" charset="-127"/>
-                <a:ea typeface="Arial Unicode MS" pitchFamily="50" charset="-127"/>
-                <a:cs typeface="Arial Unicode MS" pitchFamily="50" charset="-127"/>
-              </a:rPr>
-              <a:t>foreign</a:t>
-            </a:r>
-            <a:endParaRPr lang="en-US" altLang="ko-KR" sz="1100" dirty="0" smtClean="0">
-              <a:solidFill>
-                <a:schemeClr val="accent6">
-                  <a:lumMod val="75000"/>
-                </a:schemeClr>
-              </a:solidFill>
-              <a:latin typeface="Arial Unicode MS" pitchFamily="50" charset="-127"/>
-              <a:ea typeface="Arial Unicode MS" pitchFamily="50" charset="-127"/>
-              <a:cs typeface="Arial Unicode MS" pitchFamily="50" charset="-127"/>
-            </a:endParaRPr>
+              <a:t> foreign</a:t>
+            </a:r>
           </a:p>
           <a:p>
             <a:pPr>
@@ -7343,18 +7542,7 @@
                 <a:ea typeface="Arial Unicode MS" pitchFamily="50" charset="-127"/>
                 <a:cs typeface="Arial Unicode MS" pitchFamily="50" charset="-127"/>
               </a:rPr>
-              <a:t>name </a:t>
-            </a:r>
-            <a:r>
-              <a:rPr lang="en-US" altLang="ko-KR" sz="1100" dirty="0" smtClean="0">
-                <a:solidFill>
-                  <a:sysClr val="windowText" lastClr="000000"/>
-                </a:solidFill>
-                <a:latin typeface="Arial Unicode MS" pitchFamily="50" charset="-127"/>
-                <a:ea typeface="Arial Unicode MS" pitchFamily="50" charset="-127"/>
-                <a:cs typeface="Arial Unicode MS" pitchFamily="50" charset="-127"/>
-              </a:rPr>
-              <a:t>String</a:t>
+              <a:t>name String</a:t>
             </a:r>
           </a:p>
           <a:p>
@@ -7517,18 +7705,7 @@
                 <a:ea typeface="Arial Unicode MS" pitchFamily="50" charset="-127"/>
                 <a:cs typeface="Arial Unicode MS" pitchFamily="50" charset="-127"/>
               </a:rPr>
-              <a:t>name </a:t>
-            </a:r>
-            <a:r>
-              <a:rPr lang="en-US" altLang="ko-KR" sz="1100" dirty="0" smtClean="0">
-                <a:solidFill>
-                  <a:sysClr val="windowText" lastClr="000000"/>
-                </a:solidFill>
-                <a:latin typeface="Arial Unicode MS" pitchFamily="50" charset="-127"/>
-                <a:ea typeface="Arial Unicode MS" pitchFamily="50" charset="-127"/>
-                <a:cs typeface="Arial Unicode MS" pitchFamily="50" charset="-127"/>
-              </a:rPr>
-              <a:t>String</a:t>
+              <a:t>name String</a:t>
             </a:r>
           </a:p>
           <a:p>
@@ -7691,18 +7868,7 @@
                 <a:ea typeface="Arial Unicode MS" pitchFamily="50" charset="-127"/>
                 <a:cs typeface="Arial Unicode MS" pitchFamily="50" charset="-127"/>
               </a:rPr>
-              <a:t>name </a:t>
-            </a:r>
-            <a:r>
-              <a:rPr lang="en-US" altLang="ko-KR" sz="1100" dirty="0" smtClean="0">
-                <a:solidFill>
-                  <a:sysClr val="windowText" lastClr="000000"/>
-                </a:solidFill>
-                <a:latin typeface="Arial Unicode MS" pitchFamily="50" charset="-127"/>
-                <a:ea typeface="Arial Unicode MS" pitchFamily="50" charset="-127"/>
-                <a:cs typeface="Arial Unicode MS" pitchFamily="50" charset="-127"/>
-              </a:rPr>
-              <a:t>String</a:t>
+              <a:t>name String</a:t>
             </a:r>
           </a:p>
           <a:p>
@@ -7797,7 +7963,143 @@
               </a:rPr>
               <a:t>edit</a:t>
             </a:r>
-            <a:endParaRPr lang="en-US" altLang="ko-KR" sz="1100" b="1" dirty="0" smtClean="0">
+          </a:p>
+          <a:p>
+            <a:pPr>
+              <a:buFontTx/>
+              <a:buChar char="-"/>
+            </a:pPr>
+            <a:r>
+              <a:rPr lang="en-US" altLang="ko-KR" sz="1100" dirty="0" smtClean="0">
+                <a:solidFill>
+                  <a:sysClr val="windowText" lastClr="000000"/>
+                </a:solidFill>
+                <a:latin typeface="Arial Unicode MS" pitchFamily="50" charset="-127"/>
+                <a:ea typeface="Arial Unicode MS" pitchFamily="50" charset="-127"/>
+                <a:cs typeface="Arial Unicode MS" pitchFamily="50" charset="-127"/>
+              </a:rPr>
+              <a:t>no </a:t>
+            </a:r>
+            <a:r>
+              <a:rPr lang="en-US" altLang="ko-KR" sz="1100" dirty="0" err="1" smtClean="0">
+                <a:solidFill>
+                  <a:sysClr val="windowText" lastClr="000000"/>
+                </a:solidFill>
+                <a:latin typeface="Arial Unicode MS" pitchFamily="50" charset="-127"/>
+                <a:ea typeface="Arial Unicode MS" pitchFamily="50" charset="-127"/>
+                <a:cs typeface="Arial Unicode MS" pitchFamily="50" charset="-127"/>
+              </a:rPr>
+              <a:t>int</a:t>
+            </a:r>
+            <a:r>
+              <a:rPr lang="en-US" altLang="ko-KR" sz="1100" dirty="0" smtClean="0">
+                <a:solidFill>
+                  <a:sysClr val="windowText" lastClr="000000"/>
+                </a:solidFill>
+                <a:latin typeface="Arial Unicode MS" pitchFamily="50" charset="-127"/>
+                <a:ea typeface="Arial Unicode MS" pitchFamily="50" charset="-127"/>
+                <a:cs typeface="Arial Unicode MS" pitchFamily="50" charset="-127"/>
+              </a:rPr>
+              <a:t> primary</a:t>
+            </a:r>
+          </a:p>
+          <a:p>
+            <a:pPr>
+              <a:buFontTx/>
+              <a:buChar char="-"/>
+            </a:pPr>
+            <a:r>
+              <a:rPr lang="en-US" altLang="ko-KR" sz="1100" dirty="0" err="1" smtClean="0">
+                <a:solidFill>
+                  <a:schemeClr val="accent4">
+                    <a:lumMod val="75000"/>
+                  </a:schemeClr>
+                </a:solidFill>
+                <a:latin typeface="Arial Unicode MS" pitchFamily="50" charset="-127"/>
+                <a:ea typeface="Arial Unicode MS" pitchFamily="50" charset="-127"/>
+                <a:cs typeface="Arial Unicode MS" pitchFamily="50" charset="-127"/>
+              </a:rPr>
+              <a:t>share_board_no</a:t>
+            </a:r>
+            <a:r>
+              <a:rPr lang="en-US" altLang="ko-KR" sz="1100" dirty="0" smtClean="0">
+                <a:solidFill>
+                  <a:schemeClr val="accent4">
+                    <a:lumMod val="75000"/>
+                  </a:schemeClr>
+                </a:solidFill>
+                <a:latin typeface="Arial Unicode MS" pitchFamily="50" charset="-127"/>
+                <a:ea typeface="Arial Unicode MS" pitchFamily="50" charset="-127"/>
+                <a:cs typeface="Arial Unicode MS" pitchFamily="50" charset="-127"/>
+              </a:rPr>
+              <a:t> </a:t>
+            </a:r>
+            <a:r>
+              <a:rPr lang="en-US" altLang="ko-KR" sz="1100" dirty="0" err="1" smtClean="0">
+                <a:solidFill>
+                  <a:schemeClr val="accent4">
+                    <a:lumMod val="75000"/>
+                  </a:schemeClr>
+                </a:solidFill>
+                <a:latin typeface="Arial Unicode MS" pitchFamily="50" charset="-127"/>
+                <a:ea typeface="Arial Unicode MS" pitchFamily="50" charset="-127"/>
+                <a:cs typeface="Arial Unicode MS" pitchFamily="50" charset="-127"/>
+              </a:rPr>
+              <a:t>int</a:t>
+            </a:r>
+            <a:r>
+              <a:rPr lang="en-US" altLang="ko-KR" sz="1100" dirty="0" smtClean="0">
+                <a:solidFill>
+                  <a:schemeClr val="accent4">
+                    <a:lumMod val="75000"/>
+                  </a:schemeClr>
+                </a:solidFill>
+                <a:latin typeface="Arial Unicode MS" pitchFamily="50" charset="-127"/>
+                <a:ea typeface="Arial Unicode MS" pitchFamily="50" charset="-127"/>
+                <a:cs typeface="Arial Unicode MS" pitchFamily="50" charset="-127"/>
+              </a:rPr>
+              <a:t> foreign</a:t>
+            </a:r>
+          </a:p>
+          <a:p>
+            <a:pPr>
+              <a:buFontTx/>
+              <a:buChar char="-"/>
+            </a:pPr>
+            <a:r>
+              <a:rPr lang="en-US" altLang="ko-KR" sz="1100" dirty="0" err="1" smtClean="0">
+                <a:solidFill>
+                  <a:sysClr val="windowText" lastClr="000000"/>
+                </a:solidFill>
+                <a:latin typeface="Arial Unicode MS" pitchFamily="50" charset="-127"/>
+                <a:ea typeface="Arial Unicode MS" pitchFamily="50" charset="-127"/>
+                <a:cs typeface="Arial Unicode MS" pitchFamily="50" charset="-127"/>
+              </a:rPr>
+              <a:t>start_index</a:t>
+            </a:r>
+            <a:r>
+              <a:rPr lang="en-US" altLang="ko-KR" sz="1100" dirty="0" smtClean="0">
+                <a:solidFill>
+                  <a:sysClr val="windowText" lastClr="000000"/>
+                </a:solidFill>
+                <a:latin typeface="Arial Unicode MS" pitchFamily="50" charset="-127"/>
+                <a:ea typeface="Arial Unicode MS" pitchFamily="50" charset="-127"/>
+                <a:cs typeface="Arial Unicode MS" pitchFamily="50" charset="-127"/>
+              </a:rPr>
+              <a:t> </a:t>
+            </a:r>
+            <a:r>
+              <a:rPr lang="en-US" altLang="ko-KR" sz="1100" dirty="0" err="1" smtClean="0">
+                <a:solidFill>
+                  <a:sysClr val="windowText" lastClr="000000"/>
+                </a:solidFill>
+                <a:latin typeface="Arial Unicode MS" pitchFamily="50" charset="-127"/>
+                <a:ea typeface="Arial Unicode MS" pitchFamily="50" charset="-127"/>
+                <a:cs typeface="Arial Unicode MS" pitchFamily="50" charset="-127"/>
+              </a:rPr>
+              <a:t>int</a:t>
+            </a:r>
+            <a:endParaRPr lang="en-US" altLang="ko-KR" sz="1100" dirty="0" smtClean="0">
               <a:solidFill>
                 <a:sysClr val="windowText" lastClr="000000"/>
               </a:solidFill>
@@ -7812,6 +8114,17 @@
               <a:buChar char="-"/>
             </a:pPr>
             <a:r>
+              <a:rPr lang="en-US" altLang="ko-KR" sz="1100" dirty="0" err="1" smtClean="0">
+                <a:solidFill>
+                  <a:sysClr val="windowText" lastClr="000000"/>
+                </a:solidFill>
+                <a:latin typeface="Arial Unicode MS" pitchFamily="50" charset="-127"/>
+                <a:ea typeface="Arial Unicode MS" pitchFamily="50" charset="-127"/>
+                <a:cs typeface="Arial Unicode MS" pitchFamily="50" charset="-127"/>
+              </a:rPr>
+              <a:t>end_index</a:t>
+            </a:r>
+            <a:r>
               <a:rPr lang="en-US" altLang="ko-KR" sz="1100" dirty="0" smtClean="0">
                 <a:solidFill>
                   <a:sysClr val="windowText" lastClr="000000"/>
@@ -7820,7 +8133,7 @@
                 <a:ea typeface="Arial Unicode MS" pitchFamily="50" charset="-127"/>
                 <a:cs typeface="Arial Unicode MS" pitchFamily="50" charset="-127"/>
               </a:rPr>
-              <a:t>no </a:t>
+              <a:t> </a:t>
             </a:r>
             <a:r>
               <a:rPr lang="en-US" altLang="ko-KR" sz="1100" dirty="0" err="1" smtClean="0">
@@ -7844,190 +8157,6 @@
               </a:rPr>
               <a:t> </a:t>
             </a:r>
-            <a:r>
-              <a:rPr lang="en-US" altLang="ko-KR" sz="1100" dirty="0" smtClean="0">
-                <a:solidFill>
-                  <a:sysClr val="windowText" lastClr="000000"/>
-                </a:solidFill>
-                <a:latin typeface="Arial Unicode MS" pitchFamily="50" charset="-127"/>
-                <a:ea typeface="Arial Unicode MS" pitchFamily="50" charset="-127"/>
-                <a:cs typeface="Arial Unicode MS" pitchFamily="50" charset="-127"/>
-              </a:rPr>
-              <a:t>primary</a:t>
-            </a:r>
-          </a:p>
-          <a:p>
-            <a:pPr>
-              <a:buFontTx/>
-              <a:buChar char="-"/>
-            </a:pPr>
-            <a:r>
-              <a:rPr lang="en-US" altLang="ko-KR" sz="1100" dirty="0" err="1" smtClean="0">
-                <a:solidFill>
-                  <a:schemeClr val="accent4">
-                    <a:lumMod val="75000"/>
-                  </a:schemeClr>
-                </a:solidFill>
-                <a:latin typeface="Arial Unicode MS" pitchFamily="50" charset="-127"/>
-                <a:ea typeface="Arial Unicode MS" pitchFamily="50" charset="-127"/>
-                <a:cs typeface="Arial Unicode MS" pitchFamily="50" charset="-127"/>
-              </a:rPr>
-              <a:t>share_board_no</a:t>
-            </a:r>
-            <a:r>
-              <a:rPr lang="en-US" altLang="ko-KR" sz="1100" dirty="0" smtClean="0">
-                <a:solidFill>
-                  <a:schemeClr val="accent4">
-                    <a:lumMod val="75000"/>
-                  </a:schemeClr>
-                </a:solidFill>
-                <a:latin typeface="Arial Unicode MS" pitchFamily="50" charset="-127"/>
-                <a:ea typeface="Arial Unicode MS" pitchFamily="50" charset="-127"/>
-                <a:cs typeface="Arial Unicode MS" pitchFamily="50" charset="-127"/>
-              </a:rPr>
-              <a:t> </a:t>
-            </a:r>
-            <a:r>
-              <a:rPr lang="en-US" altLang="ko-KR" sz="1100" dirty="0" err="1" smtClean="0">
-                <a:solidFill>
-                  <a:schemeClr val="accent4">
-                    <a:lumMod val="75000"/>
-                  </a:schemeClr>
-                </a:solidFill>
-                <a:latin typeface="Arial Unicode MS" pitchFamily="50" charset="-127"/>
-                <a:ea typeface="Arial Unicode MS" pitchFamily="50" charset="-127"/>
-                <a:cs typeface="Arial Unicode MS" pitchFamily="50" charset="-127"/>
-              </a:rPr>
-              <a:t>int</a:t>
-            </a:r>
-            <a:r>
-              <a:rPr lang="en-US" altLang="ko-KR" sz="1100" dirty="0" smtClean="0">
-                <a:solidFill>
-                  <a:schemeClr val="accent4">
-                    <a:lumMod val="75000"/>
-                  </a:schemeClr>
-                </a:solidFill>
-                <a:latin typeface="Arial Unicode MS" pitchFamily="50" charset="-127"/>
-                <a:ea typeface="Arial Unicode MS" pitchFamily="50" charset="-127"/>
-                <a:cs typeface="Arial Unicode MS" pitchFamily="50" charset="-127"/>
-              </a:rPr>
-              <a:t> foreign</a:t>
-            </a:r>
-            <a:endParaRPr lang="en-US" altLang="ko-KR" sz="1100" dirty="0" smtClean="0">
-              <a:solidFill>
-                <a:schemeClr val="accent4">
-                  <a:lumMod val="75000"/>
-                </a:schemeClr>
-              </a:solidFill>
-              <a:latin typeface="Arial Unicode MS" pitchFamily="50" charset="-127"/>
-              <a:ea typeface="Arial Unicode MS" pitchFamily="50" charset="-127"/>
-              <a:cs typeface="Arial Unicode MS" pitchFamily="50" charset="-127"/>
-            </a:endParaRPr>
-          </a:p>
-          <a:p>
-            <a:pPr>
-              <a:buFontTx/>
-              <a:buChar char="-"/>
-            </a:pPr>
-            <a:r>
-              <a:rPr lang="en-US" altLang="ko-KR" sz="1100" dirty="0" err="1" smtClean="0">
-                <a:solidFill>
-                  <a:sysClr val="windowText" lastClr="000000"/>
-                </a:solidFill>
-                <a:latin typeface="Arial Unicode MS" pitchFamily="50" charset="-127"/>
-                <a:ea typeface="Arial Unicode MS" pitchFamily="50" charset="-127"/>
-                <a:cs typeface="Arial Unicode MS" pitchFamily="50" charset="-127"/>
-              </a:rPr>
-              <a:t>start_index</a:t>
-            </a:r>
-            <a:r>
-              <a:rPr lang="en-US" altLang="ko-KR" sz="1100" dirty="0" smtClean="0">
-                <a:solidFill>
-                  <a:sysClr val="windowText" lastClr="000000"/>
-                </a:solidFill>
-                <a:latin typeface="Arial Unicode MS" pitchFamily="50" charset="-127"/>
-                <a:ea typeface="Arial Unicode MS" pitchFamily="50" charset="-127"/>
-                <a:cs typeface="Arial Unicode MS" pitchFamily="50" charset="-127"/>
-              </a:rPr>
-              <a:t> </a:t>
-            </a:r>
-            <a:r>
-              <a:rPr lang="en-US" altLang="ko-KR" sz="1100" dirty="0" err="1" smtClean="0">
-                <a:solidFill>
-                  <a:sysClr val="windowText" lastClr="000000"/>
-                </a:solidFill>
-                <a:latin typeface="Arial Unicode MS" pitchFamily="50" charset="-127"/>
-                <a:ea typeface="Arial Unicode MS" pitchFamily="50" charset="-127"/>
-                <a:cs typeface="Arial Unicode MS" pitchFamily="50" charset="-127"/>
-              </a:rPr>
-              <a:t>int</a:t>
-            </a:r>
-            <a:endParaRPr lang="en-US" altLang="ko-KR" sz="1100" dirty="0" smtClean="0">
-              <a:solidFill>
-                <a:sysClr val="windowText" lastClr="000000"/>
-              </a:solidFill>
-              <a:latin typeface="Arial Unicode MS" pitchFamily="50" charset="-127"/>
-              <a:ea typeface="Arial Unicode MS" pitchFamily="50" charset="-127"/>
-              <a:cs typeface="Arial Unicode MS" pitchFamily="50" charset="-127"/>
-            </a:endParaRPr>
-          </a:p>
-          <a:p>
-            <a:pPr>
-              <a:buFontTx/>
-              <a:buChar char="-"/>
-            </a:pPr>
-            <a:r>
-              <a:rPr lang="en-US" altLang="ko-KR" sz="1100" dirty="0" err="1" smtClean="0">
-                <a:solidFill>
-                  <a:sysClr val="windowText" lastClr="000000"/>
-                </a:solidFill>
-                <a:latin typeface="Arial Unicode MS" pitchFamily="50" charset="-127"/>
-                <a:ea typeface="Arial Unicode MS" pitchFamily="50" charset="-127"/>
-                <a:cs typeface="Arial Unicode MS" pitchFamily="50" charset="-127"/>
-              </a:rPr>
-              <a:t>end_index</a:t>
-            </a:r>
-            <a:r>
-              <a:rPr lang="en-US" altLang="ko-KR" sz="1100" dirty="0" smtClean="0">
-                <a:solidFill>
-                  <a:sysClr val="windowText" lastClr="000000"/>
-                </a:solidFill>
-                <a:latin typeface="Arial Unicode MS" pitchFamily="50" charset="-127"/>
-                <a:ea typeface="Arial Unicode MS" pitchFamily="50" charset="-127"/>
-                <a:cs typeface="Arial Unicode MS" pitchFamily="50" charset="-127"/>
-              </a:rPr>
-              <a:t> </a:t>
-            </a:r>
-            <a:r>
-              <a:rPr lang="en-US" altLang="ko-KR" sz="1100" dirty="0" err="1" smtClean="0">
-                <a:solidFill>
-                  <a:sysClr val="windowText" lastClr="000000"/>
-                </a:solidFill>
-                <a:latin typeface="Arial Unicode MS" pitchFamily="50" charset="-127"/>
-                <a:ea typeface="Arial Unicode MS" pitchFamily="50" charset="-127"/>
-                <a:cs typeface="Arial Unicode MS" pitchFamily="50" charset="-127"/>
-              </a:rPr>
-              <a:t>int</a:t>
-            </a:r>
-            <a:r>
-              <a:rPr lang="en-US" altLang="ko-KR" sz="1100" dirty="0" smtClean="0">
-                <a:solidFill>
-                  <a:sysClr val="windowText" lastClr="000000"/>
-                </a:solidFill>
-                <a:latin typeface="Arial Unicode MS" pitchFamily="50" charset="-127"/>
-                <a:ea typeface="Arial Unicode MS" pitchFamily="50" charset="-127"/>
-                <a:cs typeface="Arial Unicode MS" pitchFamily="50" charset="-127"/>
-              </a:rPr>
-              <a:t> </a:t>
-            </a:r>
-            <a:endParaRPr lang="en-US" altLang="ko-KR" sz="1100" dirty="0" smtClean="0">
-              <a:solidFill>
-                <a:sysClr val="windowText" lastClr="000000"/>
-              </a:solidFill>
-              <a:latin typeface="Arial Unicode MS" pitchFamily="50" charset="-127"/>
-              <a:ea typeface="Arial Unicode MS" pitchFamily="50" charset="-127"/>
-              <a:cs typeface="Arial Unicode MS" pitchFamily="50" charset="-127"/>
-            </a:endParaRPr>
           </a:p>
           <a:p>
             <a:pPr>
@@ -8269,18 +8398,7 @@
                 <a:ea typeface="Arial Unicode MS" pitchFamily="50" charset="-127"/>
                 <a:cs typeface="Arial Unicode MS" pitchFamily="50" charset="-127"/>
               </a:rPr>
-              <a:t> </a:t>
-            </a:r>
-            <a:r>
-              <a:rPr lang="en-US" altLang="ko-KR" sz="1100" dirty="0" smtClean="0">
-                <a:solidFill>
-                  <a:sysClr val="windowText" lastClr="000000"/>
-                </a:solidFill>
-                <a:latin typeface="Arial Unicode MS" pitchFamily="50" charset="-127"/>
-                <a:ea typeface="Arial Unicode MS" pitchFamily="50" charset="-127"/>
-                <a:cs typeface="Arial Unicode MS" pitchFamily="50" charset="-127"/>
-              </a:rPr>
-              <a:t>primary</a:t>
+              <a:t> primary</a:t>
             </a:r>
           </a:p>
           <a:p>
@@ -8310,14 +8428,6 @@
               </a:rPr>
               <a:t> String</a:t>
             </a:r>
-            <a:endParaRPr lang="en-US" altLang="ko-KR" sz="1100" dirty="0" smtClean="0">
-              <a:solidFill>
-                <a:sysClr val="windowText" lastClr="000000"/>
-              </a:solidFill>
-              <a:latin typeface="Arial Unicode MS" pitchFamily="50" charset="-127"/>
-              <a:ea typeface="Arial Unicode MS" pitchFamily="50" charset="-127"/>
-              <a:cs typeface="Arial Unicode MS" pitchFamily="50" charset="-127"/>
-            </a:endParaRPr>
           </a:p>
           <a:p>
             <a:pPr>
@@ -8378,18 +8488,7 @@
                 <a:ea typeface="Arial Unicode MS" pitchFamily="50" charset="-127"/>
                 <a:cs typeface="Arial Unicode MS" pitchFamily="50" charset="-127"/>
               </a:rPr>
-              <a:t> </a:t>
-            </a:r>
-            <a:r>
-              <a:rPr lang="en-US" altLang="ko-KR" sz="1100" dirty="0" smtClean="0">
-                <a:solidFill>
-                  <a:sysClr val="windowText" lastClr="000000"/>
-                </a:solidFill>
-                <a:latin typeface="Arial Unicode MS" pitchFamily="50" charset="-127"/>
-                <a:ea typeface="Arial Unicode MS" pitchFamily="50" charset="-127"/>
-                <a:cs typeface="Arial Unicode MS" pitchFamily="50" charset="-127"/>
-              </a:rPr>
-              <a:t>String</a:t>
+              <a:t> String</a:t>
             </a:r>
           </a:p>
           <a:p>
@@ -8879,7 +8978,1174 @@
                 <a:ea typeface="Arial Unicode MS" pitchFamily="50" charset="-127"/>
                 <a:cs typeface="Arial Unicode MS" pitchFamily="50" charset="-127"/>
               </a:rPr>
-              <a:t>Prototype</a:t>
+              <a:t>DB </a:t>
+            </a:r>
+            <a:r>
+              <a:rPr lang="ko-KR" altLang="en-US" sz="2000" dirty="0" smtClean="0">
+                <a:solidFill>
+                  <a:schemeClr val="tx1"/>
+                </a:solidFill>
+                <a:latin typeface="Arial Unicode MS" pitchFamily="50" charset="-127"/>
+                <a:ea typeface="Arial Unicode MS" pitchFamily="50" charset="-127"/>
+                <a:cs typeface="Arial Unicode MS" pitchFamily="50" charset="-127"/>
+              </a:rPr>
+              <a:t>생성 스크립트</a:t>
+            </a:r>
+            <a:endParaRPr lang="ko-KR" altLang="en-US" sz="2000" dirty="0">
+              <a:solidFill>
+                <a:schemeClr val="tx1"/>
+              </a:solidFill>
+              <a:latin typeface="Arial Unicode MS" pitchFamily="50" charset="-127"/>
+              <a:ea typeface="Arial Unicode MS" pitchFamily="50" charset="-127"/>
+              <a:cs typeface="Arial Unicode MS" pitchFamily="50" charset="-127"/>
+            </a:endParaRPr>
+          </a:p>
+        </p:txBody>
+      </p:sp>
+      <p:cxnSp>
+        <p:nvCxnSpPr>
+          <p:cNvPr id="8" name="직선 연결선 7"/>
+          <p:cNvCxnSpPr/>
+          <p:nvPr/>
+        </p:nvCxnSpPr>
+        <p:spPr>
+          <a:xfrm>
+            <a:off x="791580" y="1556792"/>
+            <a:ext cx="7560840" cy="0"/>
+          </a:xfrm>
+          <a:prstGeom prst="line">
+            <a:avLst/>
+          </a:prstGeom>
+          <a:ln>
+            <a:solidFill>
+              <a:schemeClr val="tx1">
+                <a:lumMod val="65000"/>
+                <a:lumOff val="35000"/>
+              </a:schemeClr>
+            </a:solidFill>
+          </a:ln>
+        </p:spPr>
+        <p:style>
+          <a:lnRef idx="1">
+            <a:schemeClr val="accent1"/>
+          </a:lnRef>
+          <a:fillRef idx="0">
+            <a:schemeClr val="accent1"/>
+          </a:fillRef>
+          <a:effectRef idx="0">
+            <a:schemeClr val="accent1"/>
+          </a:effectRef>
+          <a:fontRef idx="minor">
+            <a:schemeClr val="tx1"/>
+          </a:fontRef>
+        </p:style>
+      </p:cxnSp>
+      <p:sp>
+        <p:nvSpPr>
+          <p:cNvPr id="6145" name="Rectangle 1"/>
+          <p:cNvSpPr>
+            <a:spLocks noChangeArrowheads="1"/>
+          </p:cNvSpPr>
+          <p:nvPr/>
+        </p:nvSpPr>
+        <p:spPr bwMode="auto">
+          <a:xfrm>
+            <a:off x="755576" y="2204864"/>
+            <a:ext cx="3096344" cy="2385268"/>
+          </a:xfrm>
+          <a:prstGeom prst="rect">
+            <a:avLst/>
+          </a:prstGeom>
+          <a:noFill/>
+          <a:ln w="9525">
+            <a:solidFill>
+              <a:schemeClr val="accent1"/>
+            </a:solidFill>
+            <a:miter lim="800000"/>
+            <a:headEnd/>
+            <a:tailEnd/>
+          </a:ln>
+          <a:effectLst/>
+        </p:spPr>
+        <p:txBody>
+          <a:bodyPr vert="horz" wrap="square" lIns="91440" tIns="45720" rIns="91440" bIns="45720" numCol="1" anchor="ctr" anchorCtr="0" compatLnSpc="1">
+            <a:prstTxWarp prst="textNoShape">
+              <a:avLst/>
+            </a:prstTxWarp>
+            <a:spAutoFit/>
+          </a:bodyPr>
+          <a:lstStyle/>
+          <a:p>
+            <a:pPr marL="0" marR="0" lvl="0" indent="0" algn="l" defTabSz="914400" rtl="0" eaLnBrk="1" fontAlgn="base" latinLnBrk="1" hangingPunct="1">
+              <a:lnSpc>
+                <a:spcPct val="100000"/>
+              </a:lnSpc>
+              <a:spcBef>
+                <a:spcPct val="0"/>
+              </a:spcBef>
+              <a:spcAft>
+                <a:spcPct val="0"/>
+              </a:spcAft>
+              <a:buClrTx/>
+              <a:buSzTx/>
+              <a:buFontTx/>
+              <a:buNone/>
+              <a:tabLst/>
+            </a:pPr>
+            <a:r>
+              <a:rPr kumimoji="1" lang="en-US" altLang="ko-KR" sz="1000" b="0" i="0" u="none" strike="noStrike" cap="none" normalizeH="0" baseline="0" dirty="0" smtClean="0">
+                <a:ln>
+                  <a:noFill/>
+                </a:ln>
+                <a:solidFill>
+                  <a:schemeClr val="tx1"/>
+                </a:solidFill>
+                <a:effectLst/>
+                <a:latin typeface="맑은 고딕" pitchFamily="50" charset="-127"/>
+                <a:ea typeface="맑은 고딕" pitchFamily="50" charset="-127"/>
+                <a:cs typeface="Times New Roman" pitchFamily="18" charset="0"/>
+              </a:rPr>
+              <a:t>CREATE table "MEMBER" (</a:t>
+            </a:r>
+            <a:endParaRPr kumimoji="1" lang="en-US" altLang="ko-KR" sz="900" b="0" i="0" u="none" strike="noStrike" cap="none" normalizeH="0" baseline="0" dirty="0" smtClean="0">
+              <a:ln>
+                <a:noFill/>
+              </a:ln>
+              <a:solidFill>
+                <a:schemeClr val="tx1"/>
+              </a:solidFill>
+              <a:effectLst/>
+              <a:latin typeface="굴림" pitchFamily="50" charset="-127"/>
+              <a:ea typeface="굴림" pitchFamily="50" charset="-127"/>
+              <a:cs typeface="굴림" pitchFamily="50" charset="-127"/>
+            </a:endParaRPr>
+          </a:p>
+          <a:p>
+            <a:pPr marL="0" marR="0" lvl="0" indent="0" algn="l" defTabSz="914400" rtl="0" eaLnBrk="0" fontAlgn="base" latinLnBrk="0" hangingPunct="0">
+              <a:lnSpc>
+                <a:spcPct val="100000"/>
+              </a:lnSpc>
+              <a:spcBef>
+                <a:spcPct val="0"/>
+              </a:spcBef>
+              <a:spcAft>
+                <a:spcPct val="0"/>
+              </a:spcAft>
+              <a:buClrTx/>
+              <a:buSzTx/>
+              <a:buFontTx/>
+              <a:buNone/>
+              <a:tabLst/>
+            </a:pPr>
+            <a:r>
+              <a:rPr kumimoji="1" lang="en-US" altLang="ko-KR" sz="1000" b="0" i="0" u="none" strike="noStrike" cap="none" normalizeH="0" baseline="0" dirty="0" smtClean="0">
+                <a:ln>
+                  <a:noFill/>
+                </a:ln>
+                <a:solidFill>
+                  <a:schemeClr val="tx1"/>
+                </a:solidFill>
+                <a:effectLst/>
+                <a:latin typeface="맑은 고딕" pitchFamily="50" charset="-127"/>
+                <a:ea typeface="맑은 고딕" pitchFamily="50" charset="-127"/>
+                <a:cs typeface="Times New Roman" pitchFamily="18" charset="0"/>
+              </a:rPr>
+              <a:t>    "NO"         NUMBER(8,0),</a:t>
+            </a:r>
+            <a:endParaRPr kumimoji="1" lang="en-US" altLang="ko-KR" sz="900" b="0" i="0" u="none" strike="noStrike" cap="none" normalizeH="0" baseline="0" dirty="0" smtClean="0">
+              <a:ln>
+                <a:noFill/>
+              </a:ln>
+              <a:solidFill>
+                <a:schemeClr val="tx1"/>
+              </a:solidFill>
+              <a:effectLst/>
+              <a:latin typeface="굴림" pitchFamily="50" charset="-127"/>
+              <a:ea typeface="굴림" pitchFamily="50" charset="-127"/>
+              <a:cs typeface="굴림" pitchFamily="50" charset="-127"/>
+            </a:endParaRPr>
+          </a:p>
+          <a:p>
+            <a:pPr marL="0" marR="0" lvl="0" indent="0" algn="l" defTabSz="914400" rtl="0" eaLnBrk="0" fontAlgn="base" latinLnBrk="0" hangingPunct="0">
+              <a:lnSpc>
+                <a:spcPct val="100000"/>
+              </a:lnSpc>
+              <a:spcBef>
+                <a:spcPct val="0"/>
+              </a:spcBef>
+              <a:spcAft>
+                <a:spcPct val="0"/>
+              </a:spcAft>
+              <a:buClrTx/>
+              <a:buSzTx/>
+              <a:buFontTx/>
+              <a:buNone/>
+              <a:tabLst/>
+            </a:pPr>
+            <a:r>
+              <a:rPr kumimoji="1" lang="en-US" altLang="ko-KR" sz="1000" b="0" i="0" u="none" strike="noStrike" cap="none" normalizeH="0" baseline="0" dirty="0" smtClean="0">
+                <a:ln>
+                  <a:noFill/>
+                </a:ln>
+                <a:solidFill>
+                  <a:schemeClr val="tx1"/>
+                </a:solidFill>
+                <a:effectLst/>
+                <a:latin typeface="맑은 고딕" pitchFamily="50" charset="-127"/>
+                <a:ea typeface="맑은 고딕" pitchFamily="50" charset="-127"/>
+                <a:cs typeface="Times New Roman" pitchFamily="18" charset="0"/>
+              </a:rPr>
+              <a:t>    "EMAIL"      VARCHAR2(80),</a:t>
+            </a:r>
+            <a:endParaRPr kumimoji="1" lang="en-US" altLang="ko-KR" sz="900" b="0" i="0" u="none" strike="noStrike" cap="none" normalizeH="0" baseline="0" dirty="0" smtClean="0">
+              <a:ln>
+                <a:noFill/>
+              </a:ln>
+              <a:solidFill>
+                <a:schemeClr val="tx1"/>
+              </a:solidFill>
+              <a:effectLst/>
+              <a:latin typeface="굴림" pitchFamily="50" charset="-127"/>
+              <a:ea typeface="굴림" pitchFamily="50" charset="-127"/>
+              <a:cs typeface="굴림" pitchFamily="50" charset="-127"/>
+            </a:endParaRPr>
+          </a:p>
+          <a:p>
+            <a:pPr marL="0" marR="0" lvl="0" indent="0" algn="l" defTabSz="914400" rtl="0" eaLnBrk="0" fontAlgn="base" latinLnBrk="0" hangingPunct="0">
+              <a:lnSpc>
+                <a:spcPct val="100000"/>
+              </a:lnSpc>
+              <a:spcBef>
+                <a:spcPct val="0"/>
+              </a:spcBef>
+              <a:spcAft>
+                <a:spcPct val="0"/>
+              </a:spcAft>
+              <a:buClrTx/>
+              <a:buSzTx/>
+              <a:buFontTx/>
+              <a:buNone/>
+              <a:tabLst/>
+            </a:pPr>
+            <a:r>
+              <a:rPr kumimoji="1" lang="en-US" altLang="ko-KR" sz="1000" b="0" i="0" u="none" strike="noStrike" cap="none" normalizeH="0" baseline="0" dirty="0" smtClean="0">
+                <a:ln>
+                  <a:noFill/>
+                </a:ln>
+                <a:solidFill>
+                  <a:schemeClr val="tx1"/>
+                </a:solidFill>
+                <a:effectLst/>
+                <a:latin typeface="맑은 고딕" pitchFamily="50" charset="-127"/>
+                <a:ea typeface="맑은 고딕" pitchFamily="50" charset="-127"/>
+                <a:cs typeface="Times New Roman" pitchFamily="18" charset="0"/>
+              </a:rPr>
+              <a:t>    "PASSWORD"   VARCHAR2(50),</a:t>
+            </a:r>
+            <a:endParaRPr kumimoji="1" lang="en-US" altLang="ko-KR" sz="900" b="0" i="0" u="none" strike="noStrike" cap="none" normalizeH="0" baseline="0" dirty="0" smtClean="0">
+              <a:ln>
+                <a:noFill/>
+              </a:ln>
+              <a:solidFill>
+                <a:schemeClr val="tx1"/>
+              </a:solidFill>
+              <a:effectLst/>
+              <a:latin typeface="굴림" pitchFamily="50" charset="-127"/>
+              <a:ea typeface="굴림" pitchFamily="50" charset="-127"/>
+              <a:cs typeface="굴림" pitchFamily="50" charset="-127"/>
+            </a:endParaRPr>
+          </a:p>
+          <a:p>
+            <a:pPr marL="0" marR="0" lvl="0" indent="0" algn="l" defTabSz="914400" rtl="0" eaLnBrk="0" fontAlgn="base" latinLnBrk="0" hangingPunct="0">
+              <a:lnSpc>
+                <a:spcPct val="100000"/>
+              </a:lnSpc>
+              <a:spcBef>
+                <a:spcPct val="0"/>
+              </a:spcBef>
+              <a:spcAft>
+                <a:spcPct val="0"/>
+              </a:spcAft>
+              <a:buClrTx/>
+              <a:buSzTx/>
+              <a:buFontTx/>
+              <a:buNone/>
+              <a:tabLst/>
+            </a:pPr>
+            <a:r>
+              <a:rPr kumimoji="1" lang="en-US" altLang="ko-KR" sz="1000" b="0" i="0" u="none" strike="noStrike" cap="none" normalizeH="0" baseline="0" dirty="0" smtClean="0">
+                <a:ln>
+                  <a:noFill/>
+                </a:ln>
+                <a:solidFill>
+                  <a:schemeClr val="tx1"/>
+                </a:solidFill>
+                <a:effectLst/>
+                <a:latin typeface="맑은 고딕" pitchFamily="50" charset="-127"/>
+                <a:ea typeface="맑은 고딕" pitchFamily="50" charset="-127"/>
+                <a:cs typeface="Times New Roman" pitchFamily="18" charset="0"/>
+              </a:rPr>
+              <a:t>    "NAME"       VARCHAR2(50),</a:t>
+            </a:r>
+            <a:endParaRPr kumimoji="1" lang="en-US" altLang="ko-KR" sz="900" b="0" i="0" u="none" strike="noStrike" cap="none" normalizeH="0" baseline="0" dirty="0" smtClean="0">
+              <a:ln>
+                <a:noFill/>
+              </a:ln>
+              <a:solidFill>
+                <a:schemeClr val="tx1"/>
+              </a:solidFill>
+              <a:effectLst/>
+              <a:latin typeface="굴림" pitchFamily="50" charset="-127"/>
+              <a:ea typeface="굴림" pitchFamily="50" charset="-127"/>
+              <a:cs typeface="굴림" pitchFamily="50" charset="-127"/>
+            </a:endParaRPr>
+          </a:p>
+          <a:p>
+            <a:pPr marL="0" marR="0" lvl="0" indent="0" algn="l" defTabSz="914400" rtl="0" eaLnBrk="0" fontAlgn="base" latinLnBrk="0" hangingPunct="0">
+              <a:lnSpc>
+                <a:spcPct val="100000"/>
+              </a:lnSpc>
+              <a:spcBef>
+                <a:spcPct val="0"/>
+              </a:spcBef>
+              <a:spcAft>
+                <a:spcPct val="0"/>
+              </a:spcAft>
+              <a:buClrTx/>
+              <a:buSzTx/>
+              <a:buFontTx/>
+              <a:buNone/>
+              <a:tabLst/>
+            </a:pPr>
+            <a:r>
+              <a:rPr kumimoji="1" lang="en-US" altLang="ko-KR" sz="1000" b="0" i="0" u="none" strike="noStrike" cap="none" normalizeH="0" baseline="0" dirty="0" smtClean="0">
+                <a:ln>
+                  <a:noFill/>
+                </a:ln>
+                <a:solidFill>
+                  <a:schemeClr val="tx1"/>
+                </a:solidFill>
+                <a:effectLst/>
+                <a:latin typeface="맑은 고딕" pitchFamily="50" charset="-127"/>
+                <a:ea typeface="맑은 고딕" pitchFamily="50" charset="-127"/>
+                <a:cs typeface="Times New Roman" pitchFamily="18" charset="0"/>
+              </a:rPr>
+              <a:t>    "PHOTO"      VARCHAR2(80),</a:t>
+            </a:r>
+            <a:endParaRPr kumimoji="1" lang="en-US" altLang="ko-KR" sz="900" b="0" i="0" u="none" strike="noStrike" cap="none" normalizeH="0" baseline="0" dirty="0" smtClean="0">
+              <a:ln>
+                <a:noFill/>
+              </a:ln>
+              <a:solidFill>
+                <a:schemeClr val="tx1"/>
+              </a:solidFill>
+              <a:effectLst/>
+              <a:latin typeface="굴림" pitchFamily="50" charset="-127"/>
+              <a:ea typeface="굴림" pitchFamily="50" charset="-127"/>
+              <a:cs typeface="굴림" pitchFamily="50" charset="-127"/>
+            </a:endParaRPr>
+          </a:p>
+          <a:p>
+            <a:pPr marL="0" marR="0" lvl="0" indent="0" algn="l" defTabSz="914400" rtl="0" eaLnBrk="0" fontAlgn="base" latinLnBrk="0" hangingPunct="0">
+              <a:lnSpc>
+                <a:spcPct val="100000"/>
+              </a:lnSpc>
+              <a:spcBef>
+                <a:spcPct val="0"/>
+              </a:spcBef>
+              <a:spcAft>
+                <a:spcPct val="0"/>
+              </a:spcAft>
+              <a:buClrTx/>
+              <a:buSzTx/>
+              <a:buFontTx/>
+              <a:buNone/>
+              <a:tabLst/>
+            </a:pPr>
+            <a:r>
+              <a:rPr kumimoji="1" lang="en-US" altLang="ko-KR" sz="1000" b="0" i="0" u="none" strike="noStrike" cap="none" normalizeH="0" baseline="0" dirty="0" smtClean="0">
+                <a:ln>
+                  <a:noFill/>
+                </a:ln>
+                <a:solidFill>
+                  <a:schemeClr val="tx1"/>
+                </a:solidFill>
+                <a:effectLst/>
+                <a:latin typeface="맑은 고딕" pitchFamily="50" charset="-127"/>
+                <a:ea typeface="맑은 고딕" pitchFamily="50" charset="-127"/>
+                <a:cs typeface="Times New Roman" pitchFamily="18" charset="0"/>
+              </a:rPr>
+              <a:t>    constraint  "MEMBER_PK" primary key ("NO")</a:t>
+            </a:r>
+            <a:endParaRPr kumimoji="1" lang="en-US" altLang="ko-KR" sz="900" b="0" i="0" u="none" strike="noStrike" cap="none" normalizeH="0" baseline="0" dirty="0" smtClean="0">
+              <a:ln>
+                <a:noFill/>
+              </a:ln>
+              <a:solidFill>
+                <a:schemeClr val="tx1"/>
+              </a:solidFill>
+              <a:effectLst/>
+              <a:latin typeface="굴림" pitchFamily="50" charset="-127"/>
+              <a:ea typeface="굴림" pitchFamily="50" charset="-127"/>
+              <a:cs typeface="굴림" pitchFamily="50" charset="-127"/>
+            </a:endParaRPr>
+          </a:p>
+          <a:p>
+            <a:pPr marL="0" marR="0" lvl="0" indent="0" algn="l" defTabSz="914400" rtl="0" eaLnBrk="0" fontAlgn="base" latinLnBrk="0" hangingPunct="0">
+              <a:lnSpc>
+                <a:spcPct val="100000"/>
+              </a:lnSpc>
+              <a:spcBef>
+                <a:spcPct val="0"/>
+              </a:spcBef>
+              <a:spcAft>
+                <a:spcPct val="0"/>
+              </a:spcAft>
+              <a:buClrTx/>
+              <a:buSzTx/>
+              <a:buFontTx/>
+              <a:buNone/>
+              <a:tabLst/>
+            </a:pPr>
+            <a:r>
+              <a:rPr kumimoji="1" lang="en-US" altLang="ko-KR" sz="1000" b="0" i="0" u="none" strike="noStrike" cap="none" normalizeH="0" baseline="0" dirty="0" smtClean="0">
+                <a:ln>
+                  <a:noFill/>
+                </a:ln>
+                <a:solidFill>
+                  <a:schemeClr val="tx1"/>
+                </a:solidFill>
+                <a:effectLst/>
+                <a:latin typeface="맑은 고딕" pitchFamily="50" charset="-127"/>
+                <a:ea typeface="맑은 고딕" pitchFamily="50" charset="-127"/>
+                <a:cs typeface="Times New Roman" pitchFamily="18" charset="0"/>
+              </a:rPr>
+              <a:t>);</a:t>
+            </a:r>
+          </a:p>
+          <a:p>
+            <a:pPr marL="0" marR="0" lvl="0" indent="0" algn="l" defTabSz="914400" rtl="0" eaLnBrk="0" fontAlgn="base" latinLnBrk="0" hangingPunct="0">
+              <a:lnSpc>
+                <a:spcPct val="100000"/>
+              </a:lnSpc>
+              <a:spcBef>
+                <a:spcPct val="0"/>
+              </a:spcBef>
+              <a:spcAft>
+                <a:spcPct val="0"/>
+              </a:spcAft>
+              <a:buClrTx/>
+              <a:buSzTx/>
+              <a:buFontTx/>
+              <a:buNone/>
+              <a:tabLst/>
+            </a:pPr>
+            <a:endParaRPr kumimoji="1" lang="en-US" altLang="ko-KR" sz="900" b="0" i="0" u="none" strike="noStrike" cap="none" normalizeH="0" baseline="0" dirty="0" smtClean="0">
+              <a:ln>
+                <a:noFill/>
+              </a:ln>
+              <a:solidFill>
+                <a:schemeClr val="tx1"/>
+              </a:solidFill>
+              <a:effectLst/>
+              <a:latin typeface="굴림" pitchFamily="50" charset="-127"/>
+              <a:ea typeface="굴림" pitchFamily="50" charset="-127"/>
+              <a:cs typeface="굴림" pitchFamily="50" charset="-127"/>
+            </a:endParaRPr>
+          </a:p>
+          <a:p>
+            <a:pPr marL="0" marR="0" lvl="0" indent="0" algn="l" defTabSz="914400" rtl="0" eaLnBrk="0" fontAlgn="base" latinLnBrk="0" hangingPunct="0">
+              <a:lnSpc>
+                <a:spcPct val="100000"/>
+              </a:lnSpc>
+              <a:spcBef>
+                <a:spcPct val="0"/>
+              </a:spcBef>
+              <a:spcAft>
+                <a:spcPct val="0"/>
+              </a:spcAft>
+              <a:buClrTx/>
+              <a:buSzTx/>
+              <a:buFontTx/>
+              <a:buNone/>
+              <a:tabLst/>
+            </a:pPr>
+            <a:r>
+              <a:rPr kumimoji="1" lang="en-US" altLang="ko-KR" sz="1000" b="0" i="0" u="none" strike="noStrike" cap="none" normalizeH="0" baseline="0" dirty="0" smtClean="0">
+                <a:ln>
+                  <a:noFill/>
+                </a:ln>
+                <a:solidFill>
+                  <a:schemeClr val="tx1"/>
+                </a:solidFill>
+                <a:effectLst/>
+                <a:latin typeface="맑은 고딕" pitchFamily="50" charset="-127"/>
+                <a:ea typeface="맑은 고딕" pitchFamily="50" charset="-127"/>
+                <a:cs typeface="Times New Roman" pitchFamily="18" charset="0"/>
+              </a:rPr>
+              <a:t>CREATE SEQUENCE </a:t>
+            </a:r>
+            <a:r>
+              <a:rPr kumimoji="1" lang="en-US" altLang="ko-KR" sz="1000" b="0" i="0" u="none" strike="noStrike" cap="none" normalizeH="0" baseline="0" dirty="0" err="1" smtClean="0">
+                <a:ln>
+                  <a:noFill/>
+                </a:ln>
+                <a:solidFill>
+                  <a:schemeClr val="tx1"/>
+                </a:solidFill>
+                <a:effectLst/>
+                <a:latin typeface="맑은 고딕" pitchFamily="50" charset="-127"/>
+                <a:ea typeface="맑은 고딕" pitchFamily="50" charset="-127"/>
+                <a:cs typeface="Times New Roman" pitchFamily="18" charset="0"/>
+              </a:rPr>
+              <a:t>member_no_seq</a:t>
+            </a:r>
+            <a:endParaRPr kumimoji="1" lang="en-US" altLang="ko-KR" sz="900" b="0" i="0" u="none" strike="noStrike" cap="none" normalizeH="0" baseline="0" dirty="0" smtClean="0">
+              <a:ln>
+                <a:noFill/>
+              </a:ln>
+              <a:solidFill>
+                <a:schemeClr val="tx1"/>
+              </a:solidFill>
+              <a:effectLst/>
+              <a:latin typeface="굴림" pitchFamily="50" charset="-127"/>
+              <a:ea typeface="굴림" pitchFamily="50" charset="-127"/>
+              <a:cs typeface="굴림" pitchFamily="50" charset="-127"/>
+            </a:endParaRPr>
+          </a:p>
+          <a:p>
+            <a:pPr marL="0" marR="0" lvl="0" indent="0" algn="l" defTabSz="914400" rtl="0" eaLnBrk="0" fontAlgn="base" latinLnBrk="0" hangingPunct="0">
+              <a:lnSpc>
+                <a:spcPct val="100000"/>
+              </a:lnSpc>
+              <a:spcBef>
+                <a:spcPct val="0"/>
+              </a:spcBef>
+              <a:spcAft>
+                <a:spcPct val="0"/>
+              </a:spcAft>
+              <a:buClrTx/>
+              <a:buSzTx/>
+              <a:buFontTx/>
+              <a:buNone/>
+              <a:tabLst/>
+            </a:pPr>
+            <a:r>
+              <a:rPr kumimoji="1" lang="en-US" altLang="ko-KR" sz="1000" b="0" i="0" u="none" strike="noStrike" cap="none" normalizeH="0" baseline="0" dirty="0" smtClean="0">
+                <a:ln>
+                  <a:noFill/>
+                </a:ln>
+                <a:solidFill>
+                  <a:schemeClr val="tx1"/>
+                </a:solidFill>
+                <a:effectLst/>
+                <a:latin typeface="맑은 고딕" pitchFamily="50" charset="-127"/>
+                <a:ea typeface="맑은 고딕" pitchFamily="50" charset="-127"/>
+                <a:cs typeface="Times New Roman" pitchFamily="18" charset="0"/>
+              </a:rPr>
+              <a:t> START WITH     1</a:t>
+            </a:r>
+            <a:endParaRPr kumimoji="1" lang="en-US" altLang="ko-KR" sz="900" b="0" i="0" u="none" strike="noStrike" cap="none" normalizeH="0" baseline="0" dirty="0" smtClean="0">
+              <a:ln>
+                <a:noFill/>
+              </a:ln>
+              <a:solidFill>
+                <a:schemeClr val="tx1"/>
+              </a:solidFill>
+              <a:effectLst/>
+              <a:latin typeface="굴림" pitchFamily="50" charset="-127"/>
+              <a:ea typeface="굴림" pitchFamily="50" charset="-127"/>
+              <a:cs typeface="굴림" pitchFamily="50" charset="-127"/>
+            </a:endParaRPr>
+          </a:p>
+          <a:p>
+            <a:pPr marL="0" marR="0" lvl="0" indent="0" algn="l" defTabSz="914400" rtl="0" eaLnBrk="0" fontAlgn="base" latinLnBrk="0" hangingPunct="0">
+              <a:lnSpc>
+                <a:spcPct val="100000"/>
+              </a:lnSpc>
+              <a:spcBef>
+                <a:spcPct val="0"/>
+              </a:spcBef>
+              <a:spcAft>
+                <a:spcPct val="0"/>
+              </a:spcAft>
+              <a:buClrTx/>
+              <a:buSzTx/>
+              <a:buFontTx/>
+              <a:buNone/>
+              <a:tabLst/>
+            </a:pPr>
+            <a:r>
+              <a:rPr kumimoji="1" lang="en-US" altLang="ko-KR" sz="1000" b="0" i="0" u="none" strike="noStrike" cap="none" normalizeH="0" baseline="0" dirty="0" smtClean="0">
+                <a:ln>
+                  <a:noFill/>
+                </a:ln>
+                <a:solidFill>
+                  <a:schemeClr val="tx1"/>
+                </a:solidFill>
+                <a:effectLst/>
+                <a:latin typeface="맑은 고딕" pitchFamily="50" charset="-127"/>
+                <a:ea typeface="맑은 고딕" pitchFamily="50" charset="-127"/>
+                <a:cs typeface="Times New Roman" pitchFamily="18" charset="0"/>
+              </a:rPr>
+              <a:t> INCREMENT BY   1</a:t>
+            </a:r>
+            <a:endParaRPr kumimoji="1" lang="en-US" altLang="ko-KR" sz="900" b="0" i="0" u="none" strike="noStrike" cap="none" normalizeH="0" baseline="0" dirty="0" smtClean="0">
+              <a:ln>
+                <a:noFill/>
+              </a:ln>
+              <a:solidFill>
+                <a:schemeClr val="tx1"/>
+              </a:solidFill>
+              <a:effectLst/>
+              <a:latin typeface="굴림" pitchFamily="50" charset="-127"/>
+              <a:ea typeface="굴림" pitchFamily="50" charset="-127"/>
+              <a:cs typeface="굴림" pitchFamily="50" charset="-127"/>
+            </a:endParaRPr>
+          </a:p>
+          <a:p>
+            <a:pPr marL="0" marR="0" lvl="0" indent="0" algn="l" defTabSz="914400" rtl="0" eaLnBrk="0" fontAlgn="base" latinLnBrk="0" hangingPunct="0">
+              <a:lnSpc>
+                <a:spcPct val="100000"/>
+              </a:lnSpc>
+              <a:spcBef>
+                <a:spcPct val="0"/>
+              </a:spcBef>
+              <a:spcAft>
+                <a:spcPct val="0"/>
+              </a:spcAft>
+              <a:buClrTx/>
+              <a:buSzTx/>
+              <a:buFontTx/>
+              <a:buNone/>
+              <a:tabLst/>
+            </a:pPr>
+            <a:r>
+              <a:rPr kumimoji="1" lang="en-US" altLang="ko-KR" sz="1000" b="0" i="0" u="none" strike="noStrike" cap="none" normalizeH="0" baseline="0" dirty="0" smtClean="0">
+                <a:ln>
+                  <a:noFill/>
+                </a:ln>
+                <a:solidFill>
+                  <a:schemeClr val="tx1"/>
+                </a:solidFill>
+                <a:effectLst/>
+                <a:latin typeface="맑은 고딕" pitchFamily="50" charset="-127"/>
+                <a:ea typeface="맑은 고딕" pitchFamily="50" charset="-127"/>
+                <a:cs typeface="Times New Roman" pitchFamily="18" charset="0"/>
+              </a:rPr>
+              <a:t> MAXVALUE       99999999</a:t>
+            </a:r>
+            <a:endParaRPr kumimoji="1" lang="en-US" altLang="ko-KR" sz="900" b="0" i="0" u="none" strike="noStrike" cap="none" normalizeH="0" baseline="0" dirty="0" smtClean="0">
+              <a:ln>
+                <a:noFill/>
+              </a:ln>
+              <a:solidFill>
+                <a:schemeClr val="tx1"/>
+              </a:solidFill>
+              <a:effectLst/>
+              <a:latin typeface="굴림" pitchFamily="50" charset="-127"/>
+              <a:ea typeface="굴림" pitchFamily="50" charset="-127"/>
+              <a:cs typeface="굴림" pitchFamily="50" charset="-127"/>
+            </a:endParaRPr>
+          </a:p>
+          <a:p>
+            <a:pPr marL="0" marR="0" lvl="0" indent="0" algn="l" defTabSz="914400" rtl="0" eaLnBrk="0" fontAlgn="base" latinLnBrk="0" hangingPunct="0">
+              <a:lnSpc>
+                <a:spcPct val="100000"/>
+              </a:lnSpc>
+              <a:spcBef>
+                <a:spcPct val="0"/>
+              </a:spcBef>
+              <a:spcAft>
+                <a:spcPct val="0"/>
+              </a:spcAft>
+              <a:buClrTx/>
+              <a:buSzTx/>
+              <a:buFontTx/>
+              <a:buNone/>
+              <a:tabLst/>
+            </a:pPr>
+            <a:r>
+              <a:rPr kumimoji="1" lang="en-US" altLang="ko-KR" sz="1000" b="0" i="0" u="none" strike="noStrike" cap="none" normalizeH="0" baseline="0" dirty="0" smtClean="0">
+                <a:ln>
+                  <a:noFill/>
+                </a:ln>
+                <a:solidFill>
+                  <a:schemeClr val="tx1"/>
+                </a:solidFill>
+                <a:effectLst/>
+                <a:latin typeface="맑은 고딕" pitchFamily="50" charset="-127"/>
+                <a:ea typeface="맑은 고딕" pitchFamily="50" charset="-127"/>
+                <a:cs typeface="Times New Roman" pitchFamily="18" charset="0"/>
+              </a:rPr>
+              <a:t> NOCACHE</a:t>
+            </a:r>
+            <a:endParaRPr kumimoji="1" lang="en-US" altLang="ko-KR" sz="900" b="0" i="0" u="none" strike="noStrike" cap="none" normalizeH="0" baseline="0" dirty="0" smtClean="0">
+              <a:ln>
+                <a:noFill/>
+              </a:ln>
+              <a:solidFill>
+                <a:schemeClr val="tx1"/>
+              </a:solidFill>
+              <a:effectLst/>
+              <a:latin typeface="굴림" pitchFamily="50" charset="-127"/>
+              <a:ea typeface="굴림" pitchFamily="50" charset="-127"/>
+              <a:cs typeface="굴림" pitchFamily="50" charset="-127"/>
+            </a:endParaRPr>
+          </a:p>
+          <a:p>
+            <a:pPr marL="0" marR="0" lvl="0" indent="0" algn="l" defTabSz="914400" rtl="0" eaLnBrk="0" fontAlgn="base" latinLnBrk="0" hangingPunct="0">
+              <a:lnSpc>
+                <a:spcPct val="100000"/>
+              </a:lnSpc>
+              <a:spcBef>
+                <a:spcPct val="0"/>
+              </a:spcBef>
+              <a:spcAft>
+                <a:spcPct val="0"/>
+              </a:spcAft>
+              <a:buClrTx/>
+              <a:buSzTx/>
+              <a:buFontTx/>
+              <a:buNone/>
+              <a:tabLst/>
+            </a:pPr>
+            <a:r>
+              <a:rPr kumimoji="1" lang="en-US" altLang="ko-KR" sz="1000" b="0" i="0" u="none" strike="noStrike" cap="none" normalizeH="0" baseline="0" dirty="0" smtClean="0">
+                <a:ln>
+                  <a:noFill/>
+                </a:ln>
+                <a:solidFill>
+                  <a:schemeClr val="tx1"/>
+                </a:solidFill>
+                <a:effectLst/>
+                <a:latin typeface="맑은 고딕" pitchFamily="50" charset="-127"/>
+                <a:ea typeface="맑은 고딕" pitchFamily="50" charset="-127"/>
+                <a:cs typeface="Times New Roman" pitchFamily="18" charset="0"/>
+              </a:rPr>
+              <a:t> NOCYCLE;</a:t>
+            </a:r>
+            <a:endParaRPr kumimoji="1" lang="en-US" altLang="ko-KR" sz="1800" b="0" i="0" u="none" strike="noStrike" cap="none" normalizeH="0" baseline="0" dirty="0" smtClean="0">
+              <a:ln>
+                <a:noFill/>
+              </a:ln>
+              <a:solidFill>
+                <a:schemeClr val="tx1"/>
+              </a:solidFill>
+              <a:effectLst/>
+              <a:latin typeface="굴림" pitchFamily="50" charset="-127"/>
+              <a:ea typeface="굴림" pitchFamily="50" charset="-127"/>
+              <a:cs typeface="굴림" pitchFamily="50" charset="-127"/>
+            </a:endParaRPr>
+          </a:p>
+        </p:txBody>
+      </p:sp>
+      <p:sp>
+        <p:nvSpPr>
+          <p:cNvPr id="5" name="TextBox 4"/>
+          <p:cNvSpPr txBox="1"/>
+          <p:nvPr/>
+        </p:nvSpPr>
+        <p:spPr>
+          <a:xfrm>
+            <a:off x="683568" y="1700808"/>
+            <a:ext cx="1682768" cy="369332"/>
+          </a:xfrm>
+          <a:prstGeom prst="rect">
+            <a:avLst/>
+          </a:prstGeom>
+          <a:noFill/>
+        </p:spPr>
+        <p:txBody>
+          <a:bodyPr wrap="none" rtlCol="0">
+            <a:spAutoFit/>
+          </a:bodyPr>
+          <a:lstStyle/>
+          <a:p>
+            <a:r>
+              <a:rPr lang="en-US" altLang="ko-KR" dirty="0" smtClean="0"/>
+              <a:t>Member Table</a:t>
+            </a:r>
+            <a:endParaRPr lang="ko-KR" altLang="en-US" dirty="0"/>
+          </a:p>
+        </p:txBody>
+      </p:sp>
+      <p:sp>
+        <p:nvSpPr>
+          <p:cNvPr id="7" name="TextBox 6"/>
+          <p:cNvSpPr txBox="1"/>
+          <p:nvPr/>
+        </p:nvSpPr>
+        <p:spPr>
+          <a:xfrm>
+            <a:off x="4860032" y="1700808"/>
+            <a:ext cx="1682768" cy="369332"/>
+          </a:xfrm>
+          <a:prstGeom prst="rect">
+            <a:avLst/>
+          </a:prstGeom>
+          <a:noFill/>
+        </p:spPr>
+        <p:txBody>
+          <a:bodyPr wrap="none" rtlCol="0">
+            <a:spAutoFit/>
+          </a:bodyPr>
+          <a:lstStyle/>
+          <a:p>
+            <a:r>
+              <a:rPr lang="en-US" altLang="ko-KR" dirty="0" smtClean="0"/>
+              <a:t>Member Table</a:t>
+            </a:r>
+            <a:endParaRPr lang="ko-KR" altLang="en-US" dirty="0"/>
+          </a:p>
+        </p:txBody>
+      </p:sp>
+    </p:spTree>
+  </p:cSld>
+  <p:clrMapOvr>
+    <a:masterClrMapping/>
+  </p:clrMapOvr>
+  <p:timing>
+    <p:tnLst>
+      <p:par>
+        <p:cTn id="1" dur="indefinite" restart="never" nodeType="tmRoot"/>
+      </p:par>
+    </p:tnLst>
+  </p:timing>
+</p:sld>
+</file>
+
+<file path=ppt/slides/slide7.xml><?xml version="1.0" encoding="utf-8"?>
+<p:sld xmlns:a="http://schemas.openxmlformats.org/drawingml/2006/main" xmlns:r="http://schemas.openxmlformats.org/officeDocument/2006/relationships" xmlns:p="http://schemas.openxmlformats.org/presentationml/2006/main">
+  <p:cSld>
+    <p:spTree>
+      <p:nvGrpSpPr>
+        <p:cNvPr id="1" name=""/>
+        <p:cNvGrpSpPr/>
+        <p:nvPr/>
+      </p:nvGrpSpPr>
+      <p:grpSpPr>
+        <a:xfrm>
+          <a:off x="0" y="0"/>
+          <a:ext cx="0" cy="0"/>
+          <a:chOff x="0" y="0"/>
+          <a:chExt cx="0" cy="0"/>
+        </a:xfrm>
+      </p:grpSpPr>
+      <p:sp>
+        <p:nvSpPr>
+          <p:cNvPr id="6" name="직사각형 5"/>
+          <p:cNvSpPr/>
+          <p:nvPr/>
+        </p:nvSpPr>
+        <p:spPr>
+          <a:xfrm>
+            <a:off x="2123728" y="908720"/>
+            <a:ext cx="4896544" cy="540000"/>
+          </a:xfrm>
+          <a:prstGeom prst="rect">
+            <a:avLst/>
+          </a:prstGeom>
+          <a:noFill/>
+          <a:ln>
+            <a:noFill/>
+          </a:ln>
+        </p:spPr>
+        <p:style>
+          <a:lnRef idx="2">
+            <a:schemeClr val="accent1">
+              <a:shade val="50000"/>
+            </a:schemeClr>
+          </a:lnRef>
+          <a:fillRef idx="1">
+            <a:schemeClr val="accent1"/>
+          </a:fillRef>
+          <a:effectRef idx="0">
+            <a:schemeClr val="accent1"/>
+          </a:effectRef>
+          <a:fontRef idx="minor">
+            <a:schemeClr val="lt1"/>
+          </a:fontRef>
+        </p:style>
+        <p:txBody>
+          <a:bodyPr rtlCol="0" anchor="ctr"/>
+          <a:lstStyle/>
+          <a:p>
+            <a:pPr algn="ctr"/>
+            <a:r>
+              <a:rPr lang="en-US" altLang="ko-KR" sz="2000" dirty="0" smtClean="0">
+                <a:solidFill>
+                  <a:schemeClr val="tx1"/>
+                </a:solidFill>
+                <a:latin typeface="Arial Unicode MS" pitchFamily="50" charset="-127"/>
+                <a:ea typeface="Arial Unicode MS" pitchFamily="50" charset="-127"/>
+                <a:cs typeface="Arial Unicode MS" pitchFamily="50" charset="-127"/>
+              </a:rPr>
+              <a:t>STUDYER _ Prototype</a:t>
+            </a:r>
+            <a:endParaRPr lang="ko-KR" altLang="en-US" sz="2000" dirty="0">
+              <a:solidFill>
+                <a:schemeClr val="tx1"/>
+              </a:solidFill>
+              <a:latin typeface="Arial Unicode MS" pitchFamily="50" charset="-127"/>
+              <a:ea typeface="Arial Unicode MS" pitchFamily="50" charset="-127"/>
+              <a:cs typeface="Arial Unicode MS" pitchFamily="50" charset="-127"/>
+            </a:endParaRPr>
+          </a:p>
+        </p:txBody>
+      </p:sp>
+      <p:cxnSp>
+        <p:nvCxnSpPr>
+          <p:cNvPr id="8" name="직선 연결선 7"/>
+          <p:cNvCxnSpPr/>
+          <p:nvPr/>
+        </p:nvCxnSpPr>
+        <p:spPr>
+          <a:xfrm>
+            <a:off x="791580" y="1556792"/>
+            <a:ext cx="7560840" cy="0"/>
+          </a:xfrm>
+          <a:prstGeom prst="line">
+            <a:avLst/>
+          </a:prstGeom>
+          <a:ln>
+            <a:solidFill>
+              <a:schemeClr val="tx1">
+                <a:lumMod val="65000"/>
+                <a:lumOff val="35000"/>
+              </a:schemeClr>
+            </a:solidFill>
+          </a:ln>
+        </p:spPr>
+        <p:style>
+          <a:lnRef idx="1">
+            <a:schemeClr val="accent1"/>
+          </a:lnRef>
+          <a:fillRef idx="0">
+            <a:schemeClr val="accent1"/>
+          </a:fillRef>
+          <a:effectRef idx="0">
+            <a:schemeClr val="accent1"/>
+          </a:effectRef>
+          <a:fontRef idx="minor">
+            <a:schemeClr val="tx1"/>
+          </a:fontRef>
+        </p:style>
+      </p:cxnSp>
+    </p:spTree>
+  </p:cSld>
+  <p:clrMapOvr>
+    <a:masterClrMapping/>
+  </p:clrMapOvr>
+  <p:timing>
+    <p:tnLst>
+      <p:par>
+        <p:cTn id="1" dur="indefinite" restart="never" nodeType="tmRoot"/>
+      </p:par>
+    </p:tnLst>
+  </p:timing>
+</p:sld>
+</file>
+
+<file path=ppt/slides/slide8.xml><?xml version="1.0" encoding="utf-8"?>
+<p:sld xmlns:a="http://schemas.openxmlformats.org/drawingml/2006/main" xmlns:r="http://schemas.openxmlformats.org/officeDocument/2006/relationships" xmlns:p="http://schemas.openxmlformats.org/presentationml/2006/main">
+  <p:cSld>
+    <p:spTree>
+      <p:nvGrpSpPr>
+        <p:cNvPr id="1" name=""/>
+        <p:cNvGrpSpPr/>
+        <p:nvPr/>
+      </p:nvGrpSpPr>
+      <p:grpSpPr>
+        <a:xfrm>
+          <a:off x="0" y="0"/>
+          <a:ext cx="0" cy="0"/>
+          <a:chOff x="0" y="0"/>
+          <a:chExt cx="0" cy="0"/>
+        </a:xfrm>
+      </p:grpSpPr>
+      <p:sp>
+        <p:nvSpPr>
+          <p:cNvPr id="6" name="직사각형 5"/>
+          <p:cNvSpPr/>
+          <p:nvPr/>
+        </p:nvSpPr>
+        <p:spPr>
+          <a:xfrm>
+            <a:off x="2123728" y="908720"/>
+            <a:ext cx="4896544" cy="540000"/>
+          </a:xfrm>
+          <a:prstGeom prst="rect">
+            <a:avLst/>
+          </a:prstGeom>
+          <a:noFill/>
+          <a:ln>
+            <a:noFill/>
+          </a:ln>
+        </p:spPr>
+        <p:style>
+          <a:lnRef idx="2">
+            <a:schemeClr val="accent1">
+              <a:shade val="50000"/>
+            </a:schemeClr>
+          </a:lnRef>
+          <a:fillRef idx="1">
+            <a:schemeClr val="accent1"/>
+          </a:fillRef>
+          <a:effectRef idx="0">
+            <a:schemeClr val="accent1"/>
+          </a:effectRef>
+          <a:fontRef idx="minor">
+            <a:schemeClr val="lt1"/>
+          </a:fontRef>
+        </p:style>
+        <p:txBody>
+          <a:bodyPr rtlCol="0" anchor="ctr"/>
+          <a:lstStyle/>
+          <a:p>
+            <a:pPr algn="ctr"/>
+            <a:r>
+              <a:rPr lang="en-US" altLang="ko-KR" sz="2000" dirty="0" smtClean="0">
+                <a:solidFill>
+                  <a:schemeClr val="tx1"/>
+                </a:solidFill>
+                <a:latin typeface="Arial Unicode MS" pitchFamily="50" charset="-127"/>
+                <a:ea typeface="Arial Unicode MS" pitchFamily="50" charset="-127"/>
+                <a:cs typeface="Arial Unicode MS" pitchFamily="50" charset="-127"/>
+              </a:rPr>
+              <a:t>STUDYER _ Prototype</a:t>
+            </a:r>
+            <a:endParaRPr lang="ko-KR" altLang="en-US" sz="2000" dirty="0">
+              <a:solidFill>
+                <a:schemeClr val="tx1"/>
+              </a:solidFill>
+              <a:latin typeface="Arial Unicode MS" pitchFamily="50" charset="-127"/>
+              <a:ea typeface="Arial Unicode MS" pitchFamily="50" charset="-127"/>
+              <a:cs typeface="Arial Unicode MS" pitchFamily="50" charset="-127"/>
+            </a:endParaRPr>
+          </a:p>
+        </p:txBody>
+      </p:sp>
+      <p:cxnSp>
+        <p:nvCxnSpPr>
+          <p:cNvPr id="8" name="직선 연결선 7"/>
+          <p:cNvCxnSpPr/>
+          <p:nvPr/>
+        </p:nvCxnSpPr>
+        <p:spPr>
+          <a:xfrm>
+            <a:off x="791580" y="1556792"/>
+            <a:ext cx="7560840" cy="0"/>
+          </a:xfrm>
+          <a:prstGeom prst="line">
+            <a:avLst/>
+          </a:prstGeom>
+          <a:ln>
+            <a:solidFill>
+              <a:schemeClr val="tx1">
+                <a:lumMod val="65000"/>
+                <a:lumOff val="35000"/>
+              </a:schemeClr>
+            </a:solidFill>
+          </a:ln>
+        </p:spPr>
+        <p:style>
+          <a:lnRef idx="1">
+            <a:schemeClr val="accent1"/>
+          </a:lnRef>
+          <a:fillRef idx="0">
+            <a:schemeClr val="accent1"/>
+          </a:fillRef>
+          <a:effectRef idx="0">
+            <a:schemeClr val="accent1"/>
+          </a:effectRef>
+          <a:fontRef idx="minor">
+            <a:schemeClr val="tx1"/>
+          </a:fontRef>
+        </p:style>
+      </p:cxnSp>
+    </p:spTree>
+  </p:cSld>
+  <p:clrMapOvr>
+    <a:masterClrMapping/>
+  </p:clrMapOvr>
+  <p:timing>
+    <p:tnLst>
+      <p:par>
+        <p:cTn id="1" dur="indefinite" restart="never" nodeType="tmRoot"/>
+      </p:par>
+    </p:tnLst>
+  </p:timing>
+</p:sld>
+</file>
+
+<file path=ppt/slides/slide9.xml><?xml version="1.0" encoding="utf-8"?>
+<p:sld xmlns:a="http://schemas.openxmlformats.org/drawingml/2006/main" xmlns:r="http://schemas.openxmlformats.org/officeDocument/2006/relationships" xmlns:p="http://schemas.openxmlformats.org/presentationml/2006/main">
+  <p:cSld>
+    <p:spTree>
+      <p:nvGrpSpPr>
+        <p:cNvPr id="1" name=""/>
+        <p:cNvGrpSpPr/>
+        <p:nvPr/>
+      </p:nvGrpSpPr>
+      <p:grpSpPr>
+        <a:xfrm>
+          <a:off x="0" y="0"/>
+          <a:ext cx="0" cy="0"/>
+          <a:chOff x="0" y="0"/>
+          <a:chExt cx="0" cy="0"/>
+        </a:xfrm>
+      </p:grpSpPr>
+      <p:sp>
+        <p:nvSpPr>
+          <p:cNvPr id="6" name="직사각형 5"/>
+          <p:cNvSpPr/>
+          <p:nvPr/>
+        </p:nvSpPr>
+        <p:spPr>
+          <a:xfrm>
+            <a:off x="2123728" y="908720"/>
+            <a:ext cx="4896544" cy="540000"/>
+          </a:xfrm>
+          <a:prstGeom prst="rect">
+            <a:avLst/>
+          </a:prstGeom>
+          <a:noFill/>
+          <a:ln>
+            <a:noFill/>
+          </a:ln>
+        </p:spPr>
+        <p:style>
+          <a:lnRef idx="2">
+            <a:schemeClr val="accent1">
+              <a:shade val="50000"/>
+            </a:schemeClr>
+          </a:lnRef>
+          <a:fillRef idx="1">
+            <a:schemeClr val="accent1"/>
+          </a:fillRef>
+          <a:effectRef idx="0">
+            <a:schemeClr val="accent1"/>
+          </a:effectRef>
+          <a:fontRef idx="minor">
+            <a:schemeClr val="lt1"/>
+          </a:fontRef>
+        </p:style>
+        <p:txBody>
+          <a:bodyPr rtlCol="0" anchor="ctr"/>
+          <a:lstStyle/>
+          <a:p>
+            <a:pPr algn="ctr"/>
+            <a:r>
+              <a:rPr lang="en-US" altLang="ko-KR" sz="2000" dirty="0" smtClean="0">
+                <a:solidFill>
+                  <a:schemeClr val="tx1"/>
+                </a:solidFill>
+                <a:latin typeface="Arial Unicode MS" pitchFamily="50" charset="-127"/>
+                <a:ea typeface="Arial Unicode MS" pitchFamily="50" charset="-127"/>
+                <a:cs typeface="Arial Unicode MS" pitchFamily="50" charset="-127"/>
+              </a:rPr>
+              <a:t>STUDYER _ Prototype</a:t>
             </a:r>
             <a:endParaRPr lang="ko-KR" altLang="en-US" sz="2000" dirty="0">
               <a:solidFill>

</xml_diff>